<commit_message>
Added permissions to all roles, closed #84, closed #108, fixed some problem, closed #100
</commit_message>
<xml_diff>
--- a/presentation/Kts_Nvt.pptx
+++ b/presentation/Kts_Nvt.pptx
@@ -8628,6 +8628,13 @@
       <p:transition/>
     </mc:Fallback>
   </mc:AlternateContent>
+  <p:timing>
+    <p:tnLst>
+      <p:par>
+        <p:cTn id="1" dur="indefinite" restart="never" nodeType="tmRoot"/>
+      </p:par>
+    </p:tnLst>
+  </p:timing>
 </p:sld>
 </file>
 
@@ -8754,14 +8761,11 @@
           <a:p>
             <a:r>
               <a:rPr lang="sr-Latn-RS" sz="2000" b="1" dirty="0"/>
-              <a:t>Front-end:</a:t>
-            </a:r>
-          </a:p>
-          <a:p>
-            <a:pPr lvl="1"/>
-            <a:r>
-              <a:rPr lang="en-US" sz="1800" dirty="0"/>
-              <a:t>Node.js</a:t>
+              <a:t>Front-end</a:t>
+            </a:r>
+            <a:r>
+              <a:rPr lang="sr-Latn-RS" sz="2000" b="1" dirty="0" smtClean="0"/>
+              <a:t>:</a:t>
             </a:r>
             <a:endParaRPr lang="sr-Latn-RS" sz="1800" dirty="0"/>
           </a:p>
@@ -8776,9 +8780,33 @@
           <a:p>
             <a:pPr lvl="1"/>
             <a:r>
-              <a:rPr lang="en-US" sz="1800" dirty="0"/>
+              <a:rPr lang="en-US" sz="1800" dirty="0" smtClean="0"/>
               <a:t>Angular</a:t>
             </a:r>
+          </a:p>
+          <a:p>
+            <a:pPr lvl="1"/>
+            <a:r>
+              <a:rPr lang="en-US" sz="1800" dirty="0" err="1" smtClean="0"/>
+              <a:t>ngMap</a:t>
+            </a:r>
+            <a:endParaRPr lang="en-US" sz="1800" dirty="0" smtClean="0"/>
+          </a:p>
+          <a:p>
+            <a:pPr lvl="1"/>
+            <a:r>
+              <a:rPr lang="en-US" sz="1800" dirty="0" err="1"/>
+              <a:t>n</a:t>
+            </a:r>
+            <a:r>
+              <a:rPr lang="en-US" sz="1800" dirty="0" err="1" smtClean="0"/>
+              <a:t>pm</a:t>
+            </a:r>
+            <a:r>
+              <a:rPr lang="en-US" sz="1800" dirty="0" smtClean="0"/>
+              <a:t>/bower </a:t>
+            </a:r>
+            <a:endParaRPr lang="en-US" sz="1800" dirty="0"/>
           </a:p>
           <a:p>
             <a:pPr lvl="1"/>
@@ -8878,14 +8906,14 @@
       </p:pic>
       <p:pic>
         <p:nvPicPr>
-          <p:cNvPr id="6" name="Picture 5"/>
+          <p:cNvPr id="7" name="Picture 6"/>
           <p:cNvPicPr>
             <a:picLocks noChangeAspect="1"/>
           </p:cNvPicPr>
           <p:nvPr/>
         </p:nvPicPr>
         <p:blipFill>
-          <a:blip r:embed="rId5" cstate="print">
+          <a:blip r:embed="rId5">
             <a:extLst>
               <a:ext uri="{28A0092B-C50C-407E-A947-70E740481C1C}">
                 <a14:useLocalDpi xmlns:a14="http://schemas.microsoft.com/office/drawing/2010/main" val="0"/>
@@ -8898,37 +8926,7 @@
         </p:blipFill>
         <p:spPr>
           <a:xfrm>
-            <a:off x="8614692" y="4744897"/>
-            <a:ext cx="2856785" cy="1751705"/>
-          </a:xfrm>
-          <a:prstGeom prst="rect">
-            <a:avLst/>
-          </a:prstGeom>
-        </p:spPr>
-      </p:pic>
-      <p:pic>
-        <p:nvPicPr>
-          <p:cNvPr id="7" name="Picture 6"/>
-          <p:cNvPicPr>
-            <a:picLocks noChangeAspect="1"/>
-          </p:cNvPicPr>
-          <p:nvPr/>
-        </p:nvPicPr>
-        <p:blipFill>
-          <a:blip r:embed="rId6">
-            <a:extLst>
-              <a:ext uri="{28A0092B-C50C-407E-A947-70E740481C1C}">
-                <a14:useLocalDpi xmlns:a14="http://schemas.microsoft.com/office/drawing/2010/main" val="0"/>
-              </a:ext>
-            </a:extLst>
-          </a:blip>
-          <a:stretch>
-            <a:fillRect/>
-          </a:stretch>
-        </p:blipFill>
-        <p:spPr>
-          <a:xfrm>
-            <a:off x="4946580" y="5065732"/>
+            <a:off x="6958508" y="4726476"/>
             <a:ext cx="2405072" cy="1110033"/>
           </a:xfrm>
           <a:prstGeom prst="rect">
@@ -8945,7 +8943,7 @@
           <p:nvPr/>
         </p:nvPicPr>
         <p:blipFill>
-          <a:blip r:embed="rId7" cstate="print">
+          <a:blip r:embed="rId6" cstate="print">
             <a:extLst>
               <a:ext uri="{28A0092B-C50C-407E-A947-70E740481C1C}">
                 <a14:useLocalDpi xmlns:a14="http://schemas.microsoft.com/office/drawing/2010/main" val="0"/>
@@ -8984,6 +8982,13 @@
       <p:transition/>
     </mc:Fallback>
   </mc:AlternateContent>
+  <p:timing>
+    <p:tnLst>
+      <p:par>
+        <p:cTn id="1" dur="indefinite" restart="never" nodeType="tmRoot"/>
+      </p:par>
+    </p:tnLst>
+  </p:timing>
 </p:sld>
 </file>
 
@@ -9108,15 +9113,7 @@
             <a:pPr lvl="1"/>
             <a:r>
               <a:rPr lang="en-US" dirty="0"/>
-              <a:t>Spring security (</a:t>
-            </a:r>
-            <a:r>
-              <a:rPr lang="en-US" dirty="0"/>
-              <a:t>authentication</a:t>
-            </a:r>
-            <a:r>
-              <a:rPr lang="en-US" dirty="0"/>
-              <a:t>)</a:t>
+              <a:t>Spring security (authentication)</a:t>
             </a:r>
           </a:p>
           <a:p>
@@ -9219,6 +9216,13 @@
       </p:transition>
     </mc:Fallback>
   </mc:AlternateContent>
+  <p:timing>
+    <p:tnLst>
+      <p:par>
+        <p:cTn id="1" dur="indefinite" restart="never" nodeType="tmRoot"/>
+      </p:par>
+    </p:tnLst>
+  </p:timing>
 </p:sld>
 </file>
 
@@ -9405,6 +9409,13 @@
       </p:transition>
     </mc:Fallback>
   </mc:AlternateContent>
+  <p:timing>
+    <p:tnLst>
+      <p:par>
+        <p:cTn id="1" dur="indefinite" restart="never" nodeType="tmRoot"/>
+      </p:par>
+    </p:tnLst>
+  </p:timing>
 </p:sld>
 </file>
 
@@ -9478,6 +9489,13 @@
       </p:transition>
     </mc:Fallback>
   </mc:AlternateContent>
+  <p:timing>
+    <p:tnLst>
+      <p:par>
+        <p:cTn id="1" dur="indefinite" restart="never" nodeType="tmRoot"/>
+      </p:par>
+    </p:tnLst>
+  </p:timing>
 </p:sld>
 </file>
 

</xml_diff>